<commit_message>
fix typos, add annotations to slides, update readme
</commit_message>
<xml_diff>
--- a/190221_Nijmegen_Rladies_workshop_R_refresher.pptx
+++ b/190221_Nijmegen_Rladies_workshop_R_refresher.pptx
@@ -12,8 +12,8 @@
     <p:sldId id="372" r:id="rId3"/>
     <p:sldId id="292" r:id="rId4"/>
     <p:sldId id="402" r:id="rId5"/>
-    <p:sldId id="403" r:id="rId6"/>
-    <p:sldId id="406" r:id="rId7"/>
+    <p:sldId id="406" r:id="rId6"/>
+    <p:sldId id="403" r:id="rId7"/>
     <p:sldId id="405" r:id="rId8"/>
   </p:sldIdLst>
   <p:sldSz cx="12192000" cy="6858000"/>
@@ -214,7 +214,7 @@
           <a:p>
             <a:fld id="{B52D06D4-9009-3B44-BD58-B6A80A66154E}" type="datetimeFigureOut">
               <a:rPr lang="en-US" smtClean="0"/>
-              <a:t>2/12/19</a:t>
+              <a:t>2/25/19</a:t>
             </a:fld>
             <a:endParaRPr lang="en-US"/>
           </a:p>
@@ -897,7 +897,7 @@
     </p:spTree>
     <p:extLst>
       <p:ext uri="{BB962C8B-B14F-4D97-AF65-F5344CB8AC3E}">
-        <p14:creationId xmlns:p14="http://schemas.microsoft.com/office/powerpoint/2010/main" val="89563717"/>
+        <p14:creationId xmlns:p14="http://schemas.microsoft.com/office/powerpoint/2010/main" val="1383083655"/>
       </p:ext>
     </p:extLst>
   </p:cSld>
@@ -981,7 +981,7 @@
     </p:spTree>
     <p:extLst>
       <p:ext uri="{BB962C8B-B14F-4D97-AF65-F5344CB8AC3E}">
-        <p14:creationId xmlns:p14="http://schemas.microsoft.com/office/powerpoint/2010/main" val="1383083655"/>
+        <p14:creationId xmlns:p14="http://schemas.microsoft.com/office/powerpoint/2010/main" val="89563717"/>
       </p:ext>
     </p:extLst>
   </p:cSld>
@@ -1206,7 +1206,7 @@
           <a:p>
             <a:fld id="{1752CE6E-CFE2-094D-AC5D-415BC90E3363}" type="datetimeFigureOut">
               <a:rPr lang="en-US" smtClean="0"/>
-              <a:t>2/12/19</a:t>
+              <a:t>2/25/19</a:t>
             </a:fld>
             <a:endParaRPr lang="en-US"/>
           </a:p>
@@ -1371,7 +1371,7 @@
           <a:p>
             <a:fld id="{1752CE6E-CFE2-094D-AC5D-415BC90E3363}" type="datetimeFigureOut">
               <a:rPr lang="en-US" smtClean="0"/>
-              <a:t>2/12/19</a:t>
+              <a:t>2/25/19</a:t>
             </a:fld>
             <a:endParaRPr lang="en-US"/>
           </a:p>
@@ -1546,7 +1546,7 @@
           <a:p>
             <a:fld id="{1752CE6E-CFE2-094D-AC5D-415BC90E3363}" type="datetimeFigureOut">
               <a:rPr lang="en-US" smtClean="0"/>
-              <a:t>2/12/19</a:t>
+              <a:t>2/25/19</a:t>
             </a:fld>
             <a:endParaRPr lang="en-US"/>
           </a:p>
@@ -1711,7 +1711,7 @@
           <a:p>
             <a:fld id="{1752CE6E-CFE2-094D-AC5D-415BC90E3363}" type="datetimeFigureOut">
               <a:rPr lang="en-US" smtClean="0"/>
-              <a:t>2/12/19</a:t>
+              <a:t>2/25/19</a:t>
             </a:fld>
             <a:endParaRPr lang="en-US"/>
           </a:p>
@@ -1952,7 +1952,7 @@
           <a:p>
             <a:fld id="{1752CE6E-CFE2-094D-AC5D-415BC90E3363}" type="datetimeFigureOut">
               <a:rPr lang="en-US" smtClean="0"/>
-              <a:t>2/12/19</a:t>
+              <a:t>2/25/19</a:t>
             </a:fld>
             <a:endParaRPr lang="en-US"/>
           </a:p>
@@ -2179,7 +2179,7 @@
           <a:p>
             <a:fld id="{1752CE6E-CFE2-094D-AC5D-415BC90E3363}" type="datetimeFigureOut">
               <a:rPr lang="en-US" smtClean="0"/>
-              <a:t>2/12/19</a:t>
+              <a:t>2/25/19</a:t>
             </a:fld>
             <a:endParaRPr lang="en-US"/>
           </a:p>
@@ -2541,7 +2541,7 @@
           <a:p>
             <a:fld id="{1752CE6E-CFE2-094D-AC5D-415BC90E3363}" type="datetimeFigureOut">
               <a:rPr lang="en-US" smtClean="0"/>
-              <a:t>2/12/19</a:t>
+              <a:t>2/25/19</a:t>
             </a:fld>
             <a:endParaRPr lang="en-US"/>
           </a:p>
@@ -2654,7 +2654,7 @@
           <a:p>
             <a:fld id="{1752CE6E-CFE2-094D-AC5D-415BC90E3363}" type="datetimeFigureOut">
               <a:rPr lang="en-US" smtClean="0"/>
-              <a:t>2/12/19</a:t>
+              <a:t>2/25/19</a:t>
             </a:fld>
             <a:endParaRPr lang="en-US"/>
           </a:p>
@@ -2744,7 +2744,7 @@
           <a:p>
             <a:fld id="{1752CE6E-CFE2-094D-AC5D-415BC90E3363}" type="datetimeFigureOut">
               <a:rPr lang="en-US" smtClean="0"/>
-              <a:t>2/12/19</a:t>
+              <a:t>2/25/19</a:t>
             </a:fld>
             <a:endParaRPr lang="en-US"/>
           </a:p>
@@ -3016,7 +3016,7 @@
           <a:p>
             <a:fld id="{1752CE6E-CFE2-094D-AC5D-415BC90E3363}" type="datetimeFigureOut">
               <a:rPr lang="en-US" smtClean="0"/>
-              <a:t>2/12/19</a:t>
+              <a:t>2/25/19</a:t>
             </a:fld>
             <a:endParaRPr lang="en-US"/>
           </a:p>
@@ -3268,7 +3268,7 @@
           <a:p>
             <a:fld id="{1752CE6E-CFE2-094D-AC5D-415BC90E3363}" type="datetimeFigureOut">
               <a:rPr lang="en-US" smtClean="0"/>
-              <a:t>2/12/19</a:t>
+              <a:t>2/25/19</a:t>
             </a:fld>
             <a:endParaRPr lang="en-US"/>
           </a:p>
@@ -3476,7 +3476,7 @@
           <a:p>
             <a:fld id="{1752CE6E-CFE2-094D-AC5D-415BC90E3363}" type="datetimeFigureOut">
               <a:rPr lang="en-US" smtClean="0"/>
-              <a:t>2/12/19</a:t>
+              <a:t>2/25/19</a:t>
             </a:fld>
             <a:endParaRPr lang="en-US"/>
           </a:p>
@@ -6379,36 +6379,23 @@
           </a:lstStyle>
           <a:p>
             <a:r>
-              <a:rPr lang="en-US" sz="3500" b="1" dirty="0" err="1" smtClean="0">
+              <a:rPr lang="en-US" sz="3500" b="1" dirty="0" smtClean="0">
                 <a:solidFill>
                   <a:schemeClr val="bg1"/>
                 </a:solidFill>
               </a:rPr>
-              <a:t>Subsetting</a:t>
+              <a:t>Assigning with </a:t>
             </a:r>
             <a:r>
               <a:rPr lang="en-US" sz="3500" b="1" dirty="0" smtClean="0">
                 <a:solidFill>
                   <a:schemeClr val="bg1"/>
                 </a:solidFill>
-              </a:rPr>
-              <a:t> a </a:t>
-            </a:r>
-            <a:r>
-              <a:rPr lang="en-US" sz="3500" b="1" dirty="0">
-                <a:solidFill>
-                  <a:schemeClr val="bg1"/>
-                </a:solidFill>
-              </a:rPr>
-              <a:t>data </a:t>
-            </a:r>
-            <a:r>
-              <a:rPr lang="en-US" sz="3500" b="1" dirty="0" smtClean="0">
-                <a:solidFill>
-                  <a:schemeClr val="bg1"/>
-                </a:solidFill>
-              </a:rPr>
-              <a:t>frame or list</a:t>
+                <a:latin typeface="Consolas" charset="0"/>
+                <a:ea typeface="Consolas" charset="0"/>
+                <a:cs typeface="Consolas" charset="0"/>
+              </a:rPr>
+              <a:t>&lt;-</a:t>
             </a:r>
             <a:endParaRPr lang="en-US" sz="3500" b="1" dirty="0">
               <a:solidFill>
@@ -6423,6 +6410,64 @@
       </p:sp>
       <p:sp>
         <p:nvSpPr>
+          <p:cNvPr id="11" name="Content Placeholder 2"/>
+          <p:cNvSpPr>
+            <a:spLocks noGrp="1"/>
+          </p:cNvSpPr>
+          <p:nvPr>
+            <p:ph idx="1"/>
+          </p:nvPr>
+        </p:nvSpPr>
+        <p:spPr>
+          <a:xfrm>
+            <a:off x="838201" y="1825625"/>
+            <a:ext cx="5033210" cy="4351338"/>
+          </a:xfrm>
+        </p:spPr>
+        <p:txBody>
+          <a:bodyPr>
+            <a:normAutofit/>
+          </a:bodyPr>
+          <a:lstStyle/>
+          <a:p>
+            <a:pPr>
+              <a:lnSpc>
+                <a:spcPct val="140000"/>
+              </a:lnSpc>
+            </a:pPr>
+            <a:r>
+              <a:rPr lang="en-GB" b="1" dirty="0" smtClean="0">
+                <a:solidFill>
+                  <a:srgbClr val="0070C0"/>
+                </a:solidFill>
+                <a:latin typeface="Consolas" charset="0"/>
+                <a:ea typeface="Consolas" charset="0"/>
+                <a:cs typeface="Consolas" charset="0"/>
+              </a:rPr>
+              <a:t>&lt;-</a:t>
+            </a:r>
+            <a:r>
+              <a:rPr lang="en-GB" dirty="0" smtClean="0">
+                <a:solidFill>
+                  <a:srgbClr val="0070C0"/>
+                </a:solidFill>
+              </a:rPr>
+              <a:t> </a:t>
+            </a:r>
+            <a:r>
+              <a:rPr lang="en-GB" dirty="0" smtClean="0"/>
+              <a:t>can be used to save a value in a variable to be reused </a:t>
+            </a:r>
+            <a:r>
+              <a:rPr lang="en-GB" dirty="0" smtClean="0"/>
+              <a:t>later</a:t>
+            </a:r>
+            <a:endParaRPr lang="en-GB" dirty="0" smtClean="0"/>
+          </a:p>
+        </p:txBody>
+      </p:sp>
+      <p:sp>
+        <p:nvSpPr>
           <p:cNvPr id="7" name="Content Placeholder 2"/>
           <p:cNvSpPr txBox="1">
             <a:spLocks/>
@@ -6431,8 +6476,8 @@
         </p:nvSpPr>
         <p:spPr>
           <a:xfrm>
-            <a:off x="5866226" y="1734387"/>
-            <a:ext cx="5827656" cy="4527050"/>
+            <a:off x="6376736" y="1825625"/>
+            <a:ext cx="5274203" cy="4351338"/>
           </a:xfrm>
           <a:prstGeom prst="rect">
             <a:avLst/>
@@ -6635,7 +6680,7 @@
               <a:t># try this example and your own! </a:t>
             </a:r>
             <a:r>
-              <a:rPr lang="en-GB" sz="2000" b="1" dirty="0" smtClean="0">
+              <a:rPr lang="en-GB" sz="2000" b="1" dirty="0">
                 <a:solidFill>
                   <a:schemeClr val="tx2">
                     <a:lumMod val="60000"/>
@@ -6649,7 +6694,7 @@
               </a:rPr>
               <a:t>:)</a:t>
             </a:r>
-            <a:endParaRPr lang="en-GB" sz="2000" b="1" dirty="0" smtClean="0">
+            <a:endParaRPr lang="en-GB" sz="2000" b="1" dirty="0">
               <a:solidFill>
                 <a:schemeClr val="tx2">
                   <a:lumMod val="60000"/>
@@ -6669,86 +6714,47 @@
               <a:buNone/>
             </a:pPr>
             <a:r>
-              <a:rPr lang="en-GB" sz="2000" b="1" dirty="0" err="1" smtClean="0">
-                <a:latin typeface="Consolas" charset="0"/>
-                <a:ea typeface="Consolas" charset="0"/>
-                <a:cs typeface="Consolas" charset="0"/>
-              </a:rPr>
-              <a:t>df</a:t>
-            </a:r>
-            <a:r>
-              <a:rPr lang="en-GB" sz="2000" b="1" dirty="0" smtClean="0">
-                <a:latin typeface="Consolas" charset="0"/>
-                <a:ea typeface="Consolas" charset="0"/>
-                <a:cs typeface="Consolas" charset="0"/>
-              </a:rPr>
-              <a:t> &lt;- </a:t>
-            </a:r>
-            <a:r>
-              <a:rPr lang="en-GB" sz="2000" b="1" dirty="0" err="1" smtClean="0">
-                <a:latin typeface="Consolas" charset="0"/>
-                <a:ea typeface="Consolas" charset="0"/>
-                <a:cs typeface="Consolas" charset="0"/>
-              </a:rPr>
-              <a:t>data.frame</a:t>
-            </a:r>
-            <a:r>
-              <a:rPr lang="en-GB" sz="2000" b="1" dirty="0" smtClean="0">
-                <a:latin typeface="Consolas" charset="0"/>
-                <a:ea typeface="Consolas" charset="0"/>
-                <a:cs typeface="Consolas" charset="0"/>
-              </a:rPr>
-              <a:t>(col1 = </a:t>
-            </a:r>
-            <a:r>
-              <a:rPr lang="de-DE" sz="2000" b="1" dirty="0" smtClean="0">
-                <a:latin typeface="Consolas" charset="0"/>
-                <a:ea typeface="Consolas" charset="0"/>
-                <a:cs typeface="Consolas" charset="0"/>
-              </a:rPr>
-              <a:t>1:3, </a:t>
-            </a:r>
-            <a:r>
-              <a:rPr lang="en-GB" sz="2000" b="1" dirty="0" smtClean="0">
-                <a:latin typeface="Consolas" charset="0"/>
-                <a:ea typeface="Consolas" charset="0"/>
-                <a:cs typeface="Consolas" charset="0"/>
-              </a:rPr>
-              <a:t>col2 </a:t>
-            </a:r>
-            <a:r>
               <a:rPr lang="en-GB" sz="2000" b="1" dirty="0">
                 <a:latin typeface="Consolas" charset="0"/>
                 <a:ea typeface="Consolas" charset="0"/>
                 <a:cs typeface="Consolas" charset="0"/>
               </a:rPr>
-              <a:t>= </a:t>
-            </a:r>
-            <a:r>
-              <a:rPr lang="de-DE" sz="2000" b="1" dirty="0" smtClean="0">
-                <a:latin typeface="Consolas" charset="0"/>
-                <a:ea typeface="Consolas" charset="0"/>
-                <a:cs typeface="Consolas" charset="0"/>
-              </a:rPr>
-              <a:t>4:6</a:t>
-            </a:r>
-            <a:r>
-              <a:rPr lang="en-GB" sz="2000" b="1" dirty="0" smtClean="0">
-                <a:latin typeface="Consolas" charset="0"/>
-                <a:ea typeface="Consolas" charset="0"/>
-                <a:cs typeface="Consolas" charset="0"/>
-              </a:rPr>
-              <a:t>)</a:t>
-            </a:r>
-          </a:p>
-          <a:p>
-            <a:pPr marL="0" indent="0">
-              <a:lnSpc>
-                <a:spcPct val="140000"/>
-              </a:lnSpc>
-              <a:buNone/>
-            </a:pPr>
-            <a:endParaRPr lang="en-GB" sz="2000" b="1" dirty="0" smtClean="0">
+              <a:t>x &lt;- </a:t>
+            </a:r>
+            <a:r>
+              <a:rPr lang="ru-RU" sz="2000" b="1" dirty="0">
+                <a:latin typeface="Consolas" charset="0"/>
+                <a:ea typeface="Consolas" charset="0"/>
+                <a:cs typeface="Consolas" charset="0"/>
+              </a:rPr>
+              <a:t>"</a:t>
+            </a:r>
+            <a:r>
+              <a:rPr lang="de-DE" sz="2000" b="1" dirty="0">
+                <a:latin typeface="Consolas" charset="0"/>
+                <a:ea typeface="Consolas" charset="0"/>
+                <a:cs typeface="Consolas" charset="0"/>
+              </a:rPr>
+              <a:t>Hi! </a:t>
+            </a:r>
+            <a:r>
+              <a:rPr lang="de-DE" sz="2000" b="1" dirty="0">
+                <a:latin typeface="Consolas" charset="0"/>
+                <a:ea typeface="Consolas" charset="0"/>
+                <a:cs typeface="Consolas" charset="0"/>
+                <a:sym typeface="Wingdings"/>
+              </a:rPr>
+              <a:t>:)</a:t>
+            </a:r>
+            <a:r>
+              <a:rPr lang="ru-RU" sz="2000" b="1" dirty="0">
+                <a:latin typeface="Consolas" charset="0"/>
+                <a:ea typeface="Consolas" charset="0"/>
+                <a:cs typeface="Consolas" charset="0"/>
+              </a:rPr>
+              <a:t>"</a:t>
+            </a:r>
+            <a:endParaRPr lang="de-DE" sz="2000" b="1" dirty="0">
               <a:latin typeface="Consolas" charset="0"/>
               <a:ea typeface="Consolas" charset="0"/>
               <a:cs typeface="Consolas" charset="0"/>
@@ -6762,12 +6768,12 @@
               <a:buNone/>
             </a:pPr>
             <a:r>
-              <a:rPr lang="en-GB" sz="2000" b="1" dirty="0" smtClean="0">
-                <a:latin typeface="Consolas" charset="0"/>
-                <a:ea typeface="Consolas" charset="0"/>
-                <a:cs typeface="Consolas" charset="0"/>
-              </a:rPr>
-              <a:t>df$col1</a:t>
+              <a:rPr lang="de-DE" sz="2000" b="1" dirty="0">
+                <a:latin typeface="Consolas" charset="0"/>
+                <a:ea typeface="Consolas" charset="0"/>
+                <a:cs typeface="Consolas" charset="0"/>
+              </a:rPr>
+              <a:t>x</a:t>
             </a:r>
           </a:p>
           <a:p>
@@ -6777,63 +6783,7 @@
               </a:lnSpc>
               <a:buNone/>
             </a:pPr>
-            <a:r>
-              <a:rPr lang="en-GB" sz="2000" b="1" dirty="0" err="1" smtClean="0">
-                <a:latin typeface="Consolas" charset="0"/>
-                <a:ea typeface="Consolas" charset="0"/>
-                <a:cs typeface="Consolas" charset="0"/>
-              </a:rPr>
-              <a:t>df</a:t>
-            </a:r>
-            <a:r>
-              <a:rPr lang="en-GB" sz="2000" b="1" dirty="0" smtClean="0">
-                <a:latin typeface="Consolas" charset="0"/>
-                <a:ea typeface="Consolas" charset="0"/>
-                <a:cs typeface="Consolas" charset="0"/>
-              </a:rPr>
-              <a:t>[[</a:t>
-            </a:r>
-            <a:r>
-              <a:rPr lang="ru-RU" sz="2000" b="1" dirty="0" smtClean="0">
-                <a:latin typeface="Consolas" charset="0"/>
-                <a:ea typeface="Consolas" charset="0"/>
-                <a:cs typeface="Consolas" charset="0"/>
-              </a:rPr>
-              <a:t>"</a:t>
-            </a:r>
-            <a:r>
-              <a:rPr lang="de-DE" sz="2000" b="1" dirty="0" smtClean="0">
-                <a:latin typeface="Consolas" charset="0"/>
-                <a:ea typeface="Consolas" charset="0"/>
-                <a:cs typeface="Consolas" charset="0"/>
-              </a:rPr>
-              <a:t>col1</a:t>
-            </a:r>
-            <a:r>
-              <a:rPr lang="ru-RU" sz="2000" b="1" dirty="0" smtClean="0">
-                <a:latin typeface="Consolas" charset="0"/>
-                <a:ea typeface="Consolas" charset="0"/>
-                <a:cs typeface="Consolas" charset="0"/>
-              </a:rPr>
-              <a:t>"</a:t>
-            </a:r>
-            <a:r>
-              <a:rPr lang="de-DE" sz="2000" b="1" dirty="0" smtClean="0">
-                <a:latin typeface="Consolas" charset="0"/>
-                <a:ea typeface="Consolas" charset="0"/>
-                <a:cs typeface="Consolas" charset="0"/>
-              </a:rPr>
-              <a:t>]]</a:t>
-            </a:r>
-          </a:p>
-          <a:p>
-            <a:pPr marL="0" indent="0">
-              <a:lnSpc>
-                <a:spcPct val="140000"/>
-              </a:lnSpc>
-              <a:buNone/>
-            </a:pPr>
-            <a:endParaRPr lang="de-DE" sz="2000" b="1" dirty="0" smtClean="0">
+            <a:endParaRPr lang="de-DE" sz="2000" b="1" dirty="0">
               <a:latin typeface="Consolas" charset="0"/>
               <a:ea typeface="Consolas" charset="0"/>
               <a:cs typeface="Consolas" charset="0"/>
@@ -6861,7 +6811,7 @@
               <a:t># </a:t>
             </a:r>
             <a:r>
-              <a:rPr lang="de-DE" sz="2000" b="1" dirty="0" err="1" smtClean="0">
+              <a:rPr lang="de-DE" sz="2000" b="1" dirty="0" err="1">
                 <a:solidFill>
                   <a:schemeClr val="tx2">
                     <a:lumMod val="60000"/>
@@ -6875,7 +6825,7 @@
               <a:t>the</a:t>
             </a:r>
             <a:r>
-              <a:rPr lang="de-DE" sz="2000" b="1" dirty="0" smtClean="0">
+              <a:rPr lang="de-DE" sz="2000" b="1" dirty="0">
                 <a:solidFill>
                   <a:schemeClr val="tx2">
                     <a:lumMod val="60000"/>
@@ -6889,7 +6839,7 @@
               <a:t> </a:t>
             </a:r>
             <a:r>
-              <a:rPr lang="de-DE" sz="2000" b="1" dirty="0" err="1" smtClean="0">
+              <a:rPr lang="de-DE" sz="2000" b="1" dirty="0" err="1">
                 <a:solidFill>
                   <a:schemeClr val="tx2">
                     <a:lumMod val="60000"/>
@@ -6903,7 +6853,7 @@
               <a:t>two</a:t>
             </a:r>
             <a:r>
-              <a:rPr lang="de-DE" sz="2000" b="1" dirty="0" smtClean="0">
+              <a:rPr lang="de-DE" sz="2000" b="1" dirty="0">
                 <a:solidFill>
                   <a:schemeClr val="tx2">
                     <a:lumMod val="60000"/>
@@ -6917,7 +6867,7 @@
               <a:t> </a:t>
             </a:r>
             <a:r>
-              <a:rPr lang="de-DE" sz="2000" b="1" dirty="0" err="1" smtClean="0">
+              <a:rPr lang="de-DE" sz="2000" b="1" dirty="0" err="1">
                 <a:solidFill>
                   <a:schemeClr val="tx2">
                     <a:lumMod val="60000"/>
@@ -6931,7 +6881,7 @@
               <a:t>results</a:t>
             </a:r>
             <a:r>
-              <a:rPr lang="de-DE" sz="2000" b="1" dirty="0" smtClean="0">
+              <a:rPr lang="de-DE" sz="2000" b="1" dirty="0">
                 <a:solidFill>
                   <a:schemeClr val="tx2">
                     <a:lumMod val="60000"/>
@@ -6945,7 +6895,7 @@
               <a:t> </a:t>
             </a:r>
             <a:r>
-              <a:rPr lang="de-DE" sz="2000" b="1" dirty="0" err="1" smtClean="0">
+              <a:rPr lang="de-DE" sz="2000" b="1" dirty="0" err="1">
                 <a:solidFill>
                   <a:schemeClr val="tx2">
                     <a:lumMod val="60000"/>
@@ -6959,7 +6909,7 @@
               <a:t>are</a:t>
             </a:r>
             <a:r>
-              <a:rPr lang="de-DE" sz="2000" b="1" dirty="0" smtClean="0">
+              <a:rPr lang="de-DE" sz="2000" b="1" dirty="0">
                 <a:solidFill>
                   <a:schemeClr val="tx2">
                     <a:lumMod val="60000"/>
@@ -6973,7 +6923,7 @@
               <a:t> </a:t>
             </a:r>
             <a:r>
-              <a:rPr lang="de-DE" sz="2000" b="1" dirty="0" err="1" smtClean="0">
+              <a:rPr lang="de-DE" sz="2000" b="1" dirty="0" err="1">
                 <a:solidFill>
                   <a:schemeClr val="tx2">
                     <a:lumMod val="60000"/>
@@ -7000,7 +6950,7 @@
               </a:rPr>
               <a:t>:</a:t>
             </a:r>
-            <a:endParaRPr lang="de-DE" sz="2000" b="1" dirty="0" smtClean="0">
+            <a:endParaRPr lang="de-DE" sz="2000" b="1" dirty="0">
               <a:latin typeface="Consolas" charset="0"/>
               <a:ea typeface="Consolas" charset="0"/>
               <a:cs typeface="Consolas" charset="0"/>
@@ -7019,23 +6969,15 @@
                 <a:ea typeface="Consolas" charset="0"/>
                 <a:cs typeface="Consolas" charset="0"/>
               </a:rPr>
-              <a:t>i</a:t>
-            </a:r>
-            <a:r>
-              <a:rPr lang="de-DE" sz="2000" b="1" dirty="0" err="1" smtClean="0">
-                <a:latin typeface="Consolas" charset="0"/>
-                <a:ea typeface="Consolas" charset="0"/>
-                <a:cs typeface="Consolas" charset="0"/>
-              </a:rPr>
-              <a:t>dentical</a:t>
-            </a:r>
-            <a:r>
-              <a:rPr lang="de-DE" sz="2000" b="1" dirty="0" smtClean="0">
-                <a:latin typeface="Consolas" charset="0"/>
-                <a:ea typeface="Consolas" charset="0"/>
-                <a:cs typeface="Consolas" charset="0"/>
-              </a:rPr>
-              <a:t>(</a:t>
+              <a:t>identical</a:t>
+            </a:r>
+            <a:r>
+              <a:rPr lang="de-DE" sz="2000" b="1" dirty="0">
+                <a:latin typeface="Consolas" charset="0"/>
+                <a:ea typeface="Consolas" charset="0"/>
+                <a:cs typeface="Consolas" charset="0"/>
+              </a:rPr>
+              <a:t>(x</a:t>
             </a:r>
             <a:r>
               <a:rPr lang="en-GB" sz="2000" b="1" dirty="0">
@@ -7043,23 +6985,7 @@
                 <a:ea typeface="Consolas" charset="0"/>
                 <a:cs typeface="Consolas" charset="0"/>
               </a:rPr>
-              <a:t>df$col1, </a:t>
-            </a:r>
-            <a:r>
-              <a:rPr lang="en-GB" sz="2000" b="1" dirty="0" err="1">
-                <a:latin typeface="Consolas" charset="0"/>
-                <a:ea typeface="Consolas" charset="0"/>
-                <a:cs typeface="Consolas" charset="0"/>
-              </a:rPr>
-              <a:t>df</a:t>
-            </a:r>
-            <a:r>
-              <a:rPr lang="en-GB" sz="2000" b="1" dirty="0">
-                <a:latin typeface="Consolas" charset="0"/>
-                <a:ea typeface="Consolas" charset="0"/>
-                <a:cs typeface="Consolas" charset="0"/>
-              </a:rPr>
-              <a:t>[[</a:t>
+              <a:t>, </a:t>
             </a:r>
             <a:r>
               <a:rPr lang="ru-RU" sz="2000" b="1" dirty="0">
@@ -7075,7 +7001,16 @@
                 <a:ea typeface="Consolas" charset="0"/>
                 <a:cs typeface="Consolas" charset="0"/>
               </a:rPr>
-              <a:t>col1</a:t>
+              <a:t>Hi! </a:t>
+            </a:r>
+            <a:r>
+              <a:rPr lang="de-DE" sz="2000" b="1" dirty="0">
+                <a:latin typeface="Consolas" charset="0"/>
+                <a:ea typeface="Consolas" charset="0"/>
+                <a:cs typeface="Consolas" charset="0"/>
+                <a:sym typeface="Wingdings"/>
+              </a:rPr>
+              <a:t>:)</a:t>
             </a:r>
             <a:r>
               <a:rPr lang="ru-RU" sz="2000" b="1" dirty="0">
@@ -7086,255 +7021,20 @@
               <a:t>"</a:t>
             </a:r>
             <a:r>
-              <a:rPr lang="de-DE" sz="2000" b="1" dirty="0" smtClean="0">
-                <a:latin typeface="Consolas" charset="0"/>
-                <a:ea typeface="Consolas" charset="0"/>
-                <a:cs typeface="Consolas" charset="0"/>
-              </a:rPr>
-              <a:t>]])</a:t>
-            </a:r>
-          </a:p>
-        </p:txBody>
-      </p:sp>
-      <p:sp>
-        <p:nvSpPr>
-          <p:cNvPr id="11" name="Content Placeholder 2"/>
-          <p:cNvSpPr>
-            <a:spLocks noGrp="1"/>
-          </p:cNvSpPr>
-          <p:nvPr>
-            <p:ph idx="1"/>
-          </p:nvPr>
-        </p:nvSpPr>
-        <p:spPr>
-          <a:xfrm>
-            <a:off x="525381" y="1825625"/>
-            <a:ext cx="4936956" cy="4351338"/>
-          </a:xfrm>
-        </p:spPr>
-        <p:txBody>
-          <a:bodyPr>
-            <a:normAutofit/>
-          </a:bodyPr>
-          <a:lstStyle/>
-          <a:p>
-            <a:pPr>
-              <a:lnSpc>
-                <a:spcPct val="140000"/>
-              </a:lnSpc>
-            </a:pPr>
-            <a:r>
-              <a:rPr lang="en-GB" dirty="0" smtClean="0"/>
-              <a:t>There are two ways we’ll get the values from a column in a data frame or a part of list during the workshop:</a:t>
-            </a:r>
-          </a:p>
-          <a:p>
-            <a:pPr marL="914400" lvl="1" indent="-457200">
-              <a:lnSpc>
-                <a:spcPct val="140000"/>
-              </a:lnSpc>
-              <a:buFont typeface="+mj-lt"/>
-              <a:buAutoNum type="arabicPeriod"/>
-            </a:pPr>
-            <a:r>
-              <a:rPr lang="en-GB" dirty="0" smtClean="0"/>
-              <a:t> </a:t>
-            </a:r>
-            <a:r>
-              <a:rPr lang="en-GB" b="1" dirty="0" err="1" smtClean="0">
-                <a:solidFill>
-                  <a:srgbClr val="0070C0"/>
-                </a:solidFill>
-                <a:latin typeface="Consolas" charset="0"/>
-                <a:ea typeface="Consolas" charset="0"/>
-                <a:cs typeface="Consolas" charset="0"/>
-              </a:rPr>
-              <a:t>df</a:t>
-            </a:r>
-            <a:r>
-              <a:rPr lang="en-GB" b="1" dirty="0" smtClean="0">
-                <a:solidFill>
-                  <a:srgbClr val="0070C0"/>
-                </a:solidFill>
-                <a:latin typeface="Consolas" charset="0"/>
-                <a:ea typeface="Consolas" charset="0"/>
-                <a:cs typeface="Consolas" charset="0"/>
-              </a:rPr>
-              <a:t>$</a:t>
-            </a:r>
-            <a:r>
-              <a:rPr lang="de-DE" b="1" dirty="0" err="1" smtClean="0">
-                <a:solidFill>
-                  <a:srgbClr val="0070C0"/>
-                </a:solidFill>
-                <a:latin typeface="Consolas" charset="0"/>
-                <a:ea typeface="Consolas" charset="0"/>
-                <a:cs typeface="Consolas" charset="0"/>
-              </a:rPr>
-              <a:t>colname</a:t>
-            </a:r>
-            <a:r>
-              <a:rPr lang="en-GB" dirty="0"/>
-              <a:t> or </a:t>
-            </a:r>
-            <a:r>
-              <a:rPr lang="de-DE" b="1" dirty="0" err="1" smtClean="0">
-                <a:solidFill>
-                  <a:srgbClr val="0070C0"/>
-                </a:solidFill>
-                <a:latin typeface="Consolas" charset="0"/>
-                <a:ea typeface="Consolas" charset="0"/>
-                <a:cs typeface="Consolas" charset="0"/>
-              </a:rPr>
-              <a:t>list$part</a:t>
-            </a:r>
-            <a:endParaRPr lang="en-GB" dirty="0"/>
-          </a:p>
-          <a:p>
-            <a:pPr marL="914400" lvl="1" indent="-457200">
-              <a:lnSpc>
-                <a:spcPct val="140000"/>
-              </a:lnSpc>
-              <a:buFont typeface="+mj-lt"/>
-              <a:buAutoNum type="arabicPeriod"/>
-            </a:pPr>
-            <a:r>
-              <a:rPr lang="en-GB" dirty="0" smtClean="0"/>
-              <a:t> </a:t>
-            </a:r>
-            <a:r>
-              <a:rPr lang="en-GB" b="1" dirty="0" err="1" smtClean="0">
-                <a:solidFill>
-                  <a:srgbClr val="0070C0"/>
-                </a:solidFill>
-                <a:latin typeface="Consolas" charset="0"/>
-                <a:ea typeface="Consolas" charset="0"/>
-                <a:cs typeface="Consolas" charset="0"/>
-              </a:rPr>
-              <a:t>df</a:t>
-            </a:r>
-            <a:r>
-              <a:rPr lang="en-GB" b="1" dirty="0" smtClean="0">
-                <a:solidFill>
-                  <a:srgbClr val="0070C0"/>
-                </a:solidFill>
-                <a:latin typeface="Consolas" charset="0"/>
-                <a:ea typeface="Consolas" charset="0"/>
-                <a:cs typeface="Consolas" charset="0"/>
-              </a:rPr>
-              <a:t>[[</a:t>
-            </a:r>
-            <a:r>
-              <a:rPr lang="ru-RU" b="1" dirty="0">
-                <a:solidFill>
-                  <a:srgbClr val="0070C0"/>
-                </a:solidFill>
-                <a:latin typeface="Consolas" charset="0"/>
-                <a:ea typeface="Consolas" charset="0"/>
-                <a:cs typeface="Consolas" charset="0"/>
-              </a:rPr>
-              <a:t>"</a:t>
-            </a:r>
-            <a:r>
-              <a:rPr lang="de-DE" b="1" dirty="0" err="1">
-                <a:solidFill>
-                  <a:srgbClr val="0070C0"/>
-                </a:solidFill>
-                <a:latin typeface="Consolas" charset="0"/>
-                <a:ea typeface="Consolas" charset="0"/>
-                <a:cs typeface="Consolas" charset="0"/>
-              </a:rPr>
-              <a:t>colname</a:t>
-            </a:r>
-            <a:r>
-              <a:rPr lang="ru-RU" b="1" dirty="0">
-                <a:solidFill>
-                  <a:srgbClr val="0070C0"/>
-                </a:solidFill>
-                <a:latin typeface="Consolas" charset="0"/>
-                <a:ea typeface="Consolas" charset="0"/>
-                <a:cs typeface="Consolas" charset="0"/>
-              </a:rPr>
-              <a:t>"</a:t>
-            </a:r>
-            <a:r>
-              <a:rPr lang="en-GB" b="1" dirty="0" smtClean="0">
-                <a:solidFill>
-                  <a:srgbClr val="0070C0"/>
-                </a:solidFill>
-                <a:latin typeface="Consolas" charset="0"/>
-                <a:ea typeface="Consolas" charset="0"/>
-                <a:cs typeface="Consolas" charset="0"/>
-              </a:rPr>
-              <a:t>]]</a:t>
-            </a:r>
-            <a:r>
-              <a:rPr lang="en-GB" dirty="0"/>
-              <a:t> or </a:t>
-            </a:r>
-            <a:r>
-              <a:rPr lang="en-GB" b="1" dirty="0" smtClean="0">
-                <a:solidFill>
-                  <a:srgbClr val="0070C0"/>
-                </a:solidFill>
-                <a:latin typeface="Consolas" charset="0"/>
-                <a:ea typeface="Consolas" charset="0"/>
-                <a:cs typeface="Consolas" charset="0"/>
-              </a:rPr>
-              <a:t> list[[</a:t>
-            </a:r>
-            <a:r>
-              <a:rPr lang="ru-RU" b="1" dirty="0" smtClean="0">
-                <a:solidFill>
-                  <a:srgbClr val="0070C0"/>
-                </a:solidFill>
-                <a:latin typeface="Consolas" charset="0"/>
-                <a:ea typeface="Consolas" charset="0"/>
-                <a:cs typeface="Consolas" charset="0"/>
-              </a:rPr>
-              <a:t>"</a:t>
-            </a:r>
-            <a:r>
-              <a:rPr lang="de-DE" b="1" dirty="0" err="1" smtClean="0">
-                <a:solidFill>
-                  <a:srgbClr val="0070C0"/>
-                </a:solidFill>
-                <a:latin typeface="Consolas" charset="0"/>
-                <a:ea typeface="Consolas" charset="0"/>
-                <a:cs typeface="Consolas" charset="0"/>
-              </a:rPr>
-              <a:t>part</a:t>
-            </a:r>
-            <a:r>
-              <a:rPr lang="ru-RU" b="1" dirty="0" smtClean="0">
-                <a:solidFill>
-                  <a:srgbClr val="0070C0"/>
-                </a:solidFill>
-                <a:latin typeface="Consolas" charset="0"/>
-                <a:ea typeface="Consolas" charset="0"/>
-                <a:cs typeface="Consolas" charset="0"/>
-              </a:rPr>
-              <a:t>"</a:t>
-            </a:r>
-            <a:r>
-              <a:rPr lang="en-GB" b="1" dirty="0" smtClean="0">
-                <a:solidFill>
-                  <a:srgbClr val="0070C0"/>
-                </a:solidFill>
-                <a:latin typeface="Consolas" charset="0"/>
-                <a:ea typeface="Consolas" charset="0"/>
-                <a:cs typeface="Consolas" charset="0"/>
-              </a:rPr>
-              <a:t>]]</a:t>
-            </a:r>
-            <a:endParaRPr lang="en-GB" dirty="0"/>
+              <a:rPr lang="de-DE" sz="2000" b="1" dirty="0">
+                <a:latin typeface="Consolas" charset="0"/>
+                <a:ea typeface="Consolas" charset="0"/>
+                <a:cs typeface="Consolas" charset="0"/>
+              </a:rPr>
+              <a:t>)</a:t>
+            </a:r>
           </a:p>
         </p:txBody>
       </p:sp>
     </p:spTree>
     <p:extLst>
       <p:ext uri="{BB962C8B-B14F-4D97-AF65-F5344CB8AC3E}">
-        <p14:creationId xmlns:p14="http://schemas.microsoft.com/office/powerpoint/2010/main" val="1667445181"/>
+        <p14:creationId xmlns:p14="http://schemas.microsoft.com/office/powerpoint/2010/main" val="455082546"/>
       </p:ext>
     </p:extLst>
   </p:cSld>
@@ -7458,23 +7158,36 @@
           </a:lstStyle>
           <a:p>
             <a:r>
+              <a:rPr lang="en-US" sz="3500" b="1" dirty="0" err="1" smtClean="0">
+                <a:solidFill>
+                  <a:schemeClr val="bg1"/>
+                </a:solidFill>
+              </a:rPr>
+              <a:t>Subsetting</a:t>
+            </a:r>
+            <a:r>
               <a:rPr lang="en-US" sz="3500" b="1" dirty="0" smtClean="0">
                 <a:solidFill>
                   <a:schemeClr val="bg1"/>
                 </a:solidFill>
               </a:rPr>
-              <a:t>Assigning with </a:t>
+              <a:t> a </a:t>
+            </a:r>
+            <a:r>
+              <a:rPr lang="en-US" sz="3500" b="1" dirty="0">
+                <a:solidFill>
+                  <a:schemeClr val="bg1"/>
+                </a:solidFill>
+              </a:rPr>
+              <a:t>data </a:t>
             </a:r>
             <a:r>
               <a:rPr lang="en-US" sz="3500" b="1" dirty="0" smtClean="0">
                 <a:solidFill>
                   <a:schemeClr val="bg1"/>
                 </a:solidFill>
-                <a:latin typeface="Consolas" charset="0"/>
-                <a:ea typeface="Consolas" charset="0"/>
-                <a:cs typeface="Consolas" charset="0"/>
-              </a:rPr>
-              <a:t>&lt;-</a:t>
+              </a:rPr>
+              <a:t>frame or list</a:t>
             </a:r>
             <a:endParaRPr lang="en-US" sz="3500" b="1" dirty="0">
               <a:solidFill>
@@ -7489,101 +7202,7 @@
       </p:sp>
       <p:sp>
         <p:nvSpPr>
-          <p:cNvPr id="11" name="Content Placeholder 2"/>
-          <p:cNvSpPr>
-            <a:spLocks noGrp="1"/>
-          </p:cNvSpPr>
-          <p:nvPr>
-            <p:ph idx="1"/>
-          </p:nvPr>
-        </p:nvSpPr>
-        <p:spPr>
-          <a:xfrm>
-            <a:off x="838201" y="1825625"/>
-            <a:ext cx="4407568" cy="4351338"/>
-          </a:xfrm>
-        </p:spPr>
-        <p:txBody>
-          <a:bodyPr>
-            <a:normAutofit/>
-          </a:bodyPr>
-          <a:lstStyle/>
-          <a:p>
-            <a:pPr>
-              <a:lnSpc>
-                <a:spcPct val="140000"/>
-              </a:lnSpc>
-            </a:pPr>
-            <a:r>
-              <a:rPr lang="en-GB" b="1" dirty="0" smtClean="0">
-                <a:solidFill>
-                  <a:srgbClr val="0070C0"/>
-                </a:solidFill>
-                <a:latin typeface="Consolas" charset="0"/>
-                <a:ea typeface="Consolas" charset="0"/>
-                <a:cs typeface="Consolas" charset="0"/>
-              </a:rPr>
-              <a:t>&lt;-</a:t>
-            </a:r>
-            <a:r>
-              <a:rPr lang="en-GB" dirty="0" smtClean="0">
-                <a:solidFill>
-                  <a:srgbClr val="0070C0"/>
-                </a:solidFill>
-              </a:rPr>
-              <a:t> </a:t>
-            </a:r>
-            <a:r>
-              <a:rPr lang="en-GB" dirty="0" smtClean="0"/>
-              <a:t>can be used to save a value in a variable to be reused later</a:t>
-            </a:r>
-          </a:p>
-          <a:p>
-            <a:pPr>
-              <a:lnSpc>
-                <a:spcPct val="140000"/>
-              </a:lnSpc>
-            </a:pPr>
-            <a:r>
-              <a:rPr lang="en-GB" dirty="0"/>
-              <a:t>s</a:t>
-            </a:r>
-            <a:r>
-              <a:rPr lang="en-GB" dirty="0" smtClean="0"/>
-              <a:t>ide note: </a:t>
-            </a:r>
-            <a:r>
-              <a:rPr lang="en-GB" b="1" dirty="0" smtClean="0">
-                <a:solidFill>
-                  <a:srgbClr val="0070C0"/>
-                </a:solidFill>
-                <a:latin typeface="Consolas" charset="0"/>
-                <a:ea typeface="Consolas" charset="0"/>
-                <a:cs typeface="Consolas" charset="0"/>
-              </a:rPr>
-              <a:t>assign()</a:t>
-            </a:r>
-            <a:r>
-              <a:rPr lang="en-GB" dirty="0"/>
-              <a:t> </a:t>
-            </a:r>
-            <a:r>
-              <a:rPr lang="en-GB" dirty="0" smtClean="0"/>
-              <a:t>can also be used! </a:t>
-            </a:r>
-            <a:r>
-              <a:rPr lang="en-GB" dirty="0" smtClean="0">
-                <a:sym typeface="Wingdings"/>
-              </a:rPr>
-              <a:t>:)</a:t>
-            </a:r>
-            <a:endParaRPr lang="en-GB" dirty="0" smtClean="0"/>
-          </a:p>
-        </p:txBody>
-      </p:sp>
-      <p:sp>
-        <p:nvSpPr>
-          <p:cNvPr id="8" name="Content Placeholder 2"/>
+          <p:cNvPr id="7" name="Content Placeholder 2"/>
           <p:cNvSpPr txBox="1">
             <a:spLocks/>
           </p:cNvSpPr>
@@ -7908,39 +7527,7 @@
               </a:lnSpc>
               <a:buNone/>
             </a:pPr>
-            <a:r>
-              <a:rPr lang="en-GB" sz="2000" b="1" dirty="0" smtClean="0">
-                <a:latin typeface="Consolas" charset="0"/>
-                <a:ea typeface="Consolas" charset="0"/>
-                <a:cs typeface="Consolas" charset="0"/>
-              </a:rPr>
-              <a:t>x &lt;- </a:t>
-            </a:r>
-            <a:r>
-              <a:rPr lang="ru-RU" sz="2000" b="1" dirty="0" smtClean="0">
-                <a:latin typeface="Consolas" charset="0"/>
-                <a:ea typeface="Consolas" charset="0"/>
-                <a:cs typeface="Consolas" charset="0"/>
-              </a:rPr>
-              <a:t>"</a:t>
-            </a:r>
-            <a:r>
-              <a:rPr lang="de-DE" sz="2000" b="1" dirty="0">
-                <a:latin typeface="Consolas" charset="0"/>
-                <a:ea typeface="Consolas" charset="0"/>
-                <a:cs typeface="Consolas" charset="0"/>
-              </a:rPr>
-              <a:t>col1</a:t>
-            </a:r>
-            <a:r>
-              <a:rPr lang="ru-RU" sz="2000" b="1" dirty="0" smtClean="0">
-                <a:latin typeface="Consolas" charset="0"/>
-                <a:ea typeface="Consolas" charset="0"/>
-                <a:cs typeface="Consolas" charset="0"/>
-              </a:rPr>
-              <a:t>"</a:t>
-            </a:r>
-            <a:endParaRPr lang="de-DE" sz="2000" b="1" dirty="0" smtClean="0">
+            <a:endParaRPr lang="en-GB" sz="2000" b="1" dirty="0" smtClean="0">
               <a:latin typeface="Consolas" charset="0"/>
               <a:ea typeface="Consolas" charset="0"/>
               <a:cs typeface="Consolas" charset="0"/>
@@ -7954,7 +7541,23 @@
               <a:buNone/>
             </a:pPr>
             <a:r>
-              <a:rPr lang="en-GB" sz="2000" b="1" dirty="0" err="1">
+              <a:rPr lang="en-GB" sz="2000" b="1" dirty="0" smtClean="0">
+                <a:latin typeface="Consolas" charset="0"/>
+                <a:ea typeface="Consolas" charset="0"/>
+                <a:cs typeface="Consolas" charset="0"/>
+              </a:rPr>
+              <a:t>df$col1</a:t>
+            </a:r>
+          </a:p>
+          <a:p>
+            <a:pPr marL="0" indent="0">
+              <a:lnSpc>
+                <a:spcPct val="140000"/>
+              </a:lnSpc>
+              <a:buNone/>
+            </a:pPr>
+            <a:r>
+              <a:rPr lang="en-GB" sz="2000" b="1" dirty="0" err="1" smtClean="0">
                 <a:latin typeface="Consolas" charset="0"/>
                 <a:ea typeface="Consolas" charset="0"/>
                 <a:cs typeface="Consolas" charset="0"/>
@@ -7970,39 +7573,23 @@
               <a:t>[[</a:t>
             </a:r>
             <a:r>
+              <a:rPr lang="ru-RU" sz="2000" b="1" dirty="0" smtClean="0">
+                <a:latin typeface="Consolas" charset="0"/>
+                <a:ea typeface="Consolas" charset="0"/>
+                <a:cs typeface="Consolas" charset="0"/>
+              </a:rPr>
+              <a:t>"</a:t>
+            </a:r>
+            <a:r>
               <a:rPr lang="de-DE" sz="2000" b="1" dirty="0" smtClean="0">
                 <a:latin typeface="Consolas" charset="0"/>
                 <a:ea typeface="Consolas" charset="0"/>
                 <a:cs typeface="Consolas" charset="0"/>
               </a:rPr>
-              <a:t>x]]</a:t>
-            </a:r>
-          </a:p>
-          <a:p>
-            <a:pPr marL="0" indent="0">
-              <a:lnSpc>
-                <a:spcPct val="140000"/>
-              </a:lnSpc>
-              <a:buNone/>
-            </a:pPr>
-            <a:r>
-              <a:rPr lang="en-GB" sz="2000" b="1" dirty="0" err="1" smtClean="0">
-                <a:latin typeface="Consolas" charset="0"/>
-                <a:ea typeface="Consolas" charset="0"/>
-                <a:cs typeface="Consolas" charset="0"/>
-              </a:rPr>
-              <a:t>df</a:t>
-            </a:r>
-            <a:r>
-              <a:rPr lang="en-GB" sz="2000" b="1" dirty="0">
-                <a:latin typeface="Consolas" charset="0"/>
-                <a:ea typeface="Consolas" charset="0"/>
-                <a:cs typeface="Consolas" charset="0"/>
-              </a:rPr>
-              <a:t>[[</a:t>
-            </a:r>
-            <a:r>
-              <a:rPr lang="ru-RU" sz="2000" b="1" dirty="0">
+              <a:t>col1</a:t>
+            </a:r>
+            <a:r>
+              <a:rPr lang="ru-RU" sz="2000" b="1" dirty="0" smtClean="0">
                 <a:latin typeface="Consolas" charset="0"/>
                 <a:ea typeface="Consolas" charset="0"/>
                 <a:cs typeface="Consolas" charset="0"/>
@@ -8010,23 +7597,7 @@
               <a:t>"</a:t>
             </a:r>
             <a:r>
-              <a:rPr lang="de-DE" sz="2000" b="1" dirty="0">
-                <a:latin typeface="Consolas" charset="0"/>
-                <a:ea typeface="Consolas" charset="0"/>
-                <a:cs typeface="Consolas" charset="0"/>
-              </a:rPr>
-              <a:t>col1</a:t>
-            </a:r>
-            <a:r>
-              <a:rPr lang="ru-RU" sz="2000" b="1" dirty="0">
-                <a:latin typeface="Consolas" charset="0"/>
-                <a:ea typeface="Consolas" charset="0"/>
-                <a:cs typeface="Consolas" charset="0"/>
-              </a:rPr>
-              <a:t>"</a:t>
-            </a:r>
-            <a:r>
-              <a:rPr lang="de-DE" sz="2000" b="1" dirty="0">
+              <a:rPr lang="de-DE" sz="2000" b="1" dirty="0" smtClean="0">
                 <a:latin typeface="Consolas" charset="0"/>
                 <a:ea typeface="Consolas" charset="0"/>
                 <a:cs typeface="Consolas" charset="0"/>
@@ -8069,7 +7640,7 @@
               <a:t># </a:t>
             </a:r>
             <a:r>
-              <a:rPr lang="de-DE" sz="2000" b="1" dirty="0" err="1">
+              <a:rPr lang="de-DE" sz="2000" b="1" dirty="0" err="1" smtClean="0">
                 <a:solidFill>
                   <a:schemeClr val="tx2">
                     <a:lumMod val="60000"/>
@@ -8083,7 +7654,7 @@
               <a:t>the</a:t>
             </a:r>
             <a:r>
-              <a:rPr lang="de-DE" sz="2000" b="1" dirty="0">
+              <a:rPr lang="de-DE" sz="2000" b="1" dirty="0" smtClean="0">
                 <a:solidFill>
                   <a:schemeClr val="tx2">
                     <a:lumMod val="60000"/>
@@ -8097,7 +7668,7 @@
               <a:t> </a:t>
             </a:r>
             <a:r>
-              <a:rPr lang="de-DE" sz="2000" b="1" dirty="0" err="1">
+              <a:rPr lang="de-DE" sz="2000" b="1" dirty="0" err="1" smtClean="0">
                 <a:solidFill>
                   <a:schemeClr val="tx2">
                     <a:lumMod val="60000"/>
@@ -8111,7 +7682,7 @@
               <a:t>two</a:t>
             </a:r>
             <a:r>
-              <a:rPr lang="de-DE" sz="2000" b="1" dirty="0">
+              <a:rPr lang="de-DE" sz="2000" b="1" dirty="0" smtClean="0">
                 <a:solidFill>
                   <a:schemeClr val="tx2">
                     <a:lumMod val="60000"/>
@@ -8125,7 +7696,7 @@
               <a:t> </a:t>
             </a:r>
             <a:r>
-              <a:rPr lang="de-DE" sz="2000" b="1" dirty="0" err="1">
+              <a:rPr lang="de-DE" sz="2000" b="1" dirty="0" err="1" smtClean="0">
                 <a:solidFill>
                   <a:schemeClr val="tx2">
                     <a:lumMod val="60000"/>
@@ -8139,7 +7710,7 @@
               <a:t>results</a:t>
             </a:r>
             <a:r>
-              <a:rPr lang="de-DE" sz="2000" b="1" dirty="0">
+              <a:rPr lang="de-DE" sz="2000" b="1" dirty="0" smtClean="0">
                 <a:solidFill>
                   <a:schemeClr val="tx2">
                     <a:lumMod val="60000"/>
@@ -8153,7 +7724,7 @@
               <a:t> </a:t>
             </a:r>
             <a:r>
-              <a:rPr lang="de-DE" sz="2000" b="1" dirty="0" err="1">
+              <a:rPr lang="de-DE" sz="2000" b="1" dirty="0" err="1" smtClean="0">
                 <a:solidFill>
                   <a:schemeClr val="tx2">
                     <a:lumMod val="60000"/>
@@ -8167,7 +7738,7 @@
               <a:t>are</a:t>
             </a:r>
             <a:r>
-              <a:rPr lang="de-DE" sz="2000" b="1" dirty="0">
+              <a:rPr lang="de-DE" sz="2000" b="1" dirty="0" smtClean="0">
                 <a:solidFill>
                   <a:schemeClr val="tx2">
                     <a:lumMod val="60000"/>
@@ -8181,7 +7752,7 @@
               <a:t> </a:t>
             </a:r>
             <a:r>
-              <a:rPr lang="de-DE" sz="2000" b="1" dirty="0" err="1">
+              <a:rPr lang="de-DE" sz="2000" b="1" dirty="0" err="1" smtClean="0">
                 <a:solidFill>
                   <a:schemeClr val="tx2">
                     <a:lumMod val="60000"/>
@@ -8195,7 +7766,7 @@
               <a:t>identical</a:t>
             </a:r>
             <a:r>
-              <a:rPr lang="de-DE" sz="2000" b="1">
+              <a:rPr lang="de-DE" sz="2000" b="1" dirty="0">
                 <a:solidFill>
                   <a:schemeClr val="tx2">
                     <a:lumMod val="60000"/>
@@ -8208,7 +7779,7 @@
               </a:rPr>
               <a:t>:</a:t>
             </a:r>
-            <a:endParaRPr lang="de-DE" sz="2000" b="1">
+            <a:endParaRPr lang="de-DE" sz="2000" b="1" dirty="0" smtClean="0">
               <a:latin typeface="Consolas" charset="0"/>
               <a:ea typeface="Consolas" charset="0"/>
               <a:cs typeface="Consolas" charset="0"/>
@@ -8222,12 +7793,20 @@
               <a:buNone/>
             </a:pPr>
             <a:r>
-              <a:rPr lang="de-DE" sz="2000" b="1" smtClean="0">
-                <a:latin typeface="Consolas" charset="0"/>
-                <a:ea typeface="Consolas" charset="0"/>
-                <a:cs typeface="Consolas" charset="0"/>
-              </a:rPr>
-              <a:t>identical</a:t>
+              <a:rPr lang="de-DE" sz="2000" b="1" dirty="0" err="1">
+                <a:latin typeface="Consolas" charset="0"/>
+                <a:ea typeface="Consolas" charset="0"/>
+                <a:cs typeface="Consolas" charset="0"/>
+              </a:rPr>
+              <a:t>i</a:t>
+            </a:r>
+            <a:r>
+              <a:rPr lang="de-DE" sz="2000" b="1" dirty="0" err="1" smtClean="0">
+                <a:latin typeface="Consolas" charset="0"/>
+                <a:ea typeface="Consolas" charset="0"/>
+                <a:cs typeface="Consolas" charset="0"/>
+              </a:rPr>
+              <a:t>dentical</a:t>
             </a:r>
             <a:r>
               <a:rPr lang="de-DE" sz="2000" b="1" dirty="0" smtClean="0">
@@ -8238,6 +7817,14 @@
               <a:t>(</a:t>
             </a:r>
             <a:r>
+              <a:rPr lang="en-GB" sz="2000" b="1" dirty="0">
+                <a:latin typeface="Consolas" charset="0"/>
+                <a:ea typeface="Consolas" charset="0"/>
+                <a:cs typeface="Consolas" charset="0"/>
+              </a:rPr>
+              <a:t>df$col1, </a:t>
+            </a:r>
+            <a:r>
               <a:rPr lang="en-GB" sz="2000" b="1" dirty="0" err="1">
                 <a:latin typeface="Consolas" charset="0"/>
                 <a:ea typeface="Consolas" charset="0"/>
@@ -8254,23 +7841,89 @@
               <a:t>[[</a:t>
             </a:r>
             <a:r>
+              <a:rPr lang="ru-RU" sz="2000" b="1" dirty="0">
+                <a:latin typeface="Consolas" charset="0"/>
+                <a:ea typeface="Consolas" charset="0"/>
+                <a:cs typeface="Consolas" charset="0"/>
+              </a:rPr>
+              <a:t>"</a:t>
+            </a:r>
+            <a:r>
               <a:rPr lang="de-DE" sz="2000" b="1" dirty="0">
                 <a:latin typeface="Consolas" charset="0"/>
                 <a:ea typeface="Consolas" charset="0"/>
                 <a:cs typeface="Consolas" charset="0"/>
               </a:rPr>
-              <a:t>x]]</a:t>
-            </a:r>
-            <a:r>
-              <a:rPr lang="en-GB" sz="2000" b="1" dirty="0" smtClean="0">
-                <a:latin typeface="Consolas" charset="0"/>
-                <a:ea typeface="Consolas" charset="0"/>
-                <a:cs typeface="Consolas" charset="0"/>
-              </a:rPr>
-              <a:t>, </a:t>
-            </a:r>
-            <a:r>
-              <a:rPr lang="en-GB" sz="2000" b="1" dirty="0" err="1">
+              <a:t>col1</a:t>
+            </a:r>
+            <a:r>
+              <a:rPr lang="ru-RU" sz="2000" b="1" dirty="0">
+                <a:latin typeface="Consolas" charset="0"/>
+                <a:ea typeface="Consolas" charset="0"/>
+                <a:cs typeface="Consolas" charset="0"/>
+              </a:rPr>
+              <a:t>"</a:t>
+            </a:r>
+            <a:r>
+              <a:rPr lang="de-DE" sz="2000" b="1" dirty="0" smtClean="0">
+                <a:latin typeface="Consolas" charset="0"/>
+                <a:ea typeface="Consolas" charset="0"/>
+                <a:cs typeface="Consolas" charset="0"/>
+              </a:rPr>
+              <a:t>]])</a:t>
+            </a:r>
+          </a:p>
+        </p:txBody>
+      </p:sp>
+      <p:sp>
+        <p:nvSpPr>
+          <p:cNvPr id="11" name="Content Placeholder 2"/>
+          <p:cNvSpPr>
+            <a:spLocks noGrp="1"/>
+          </p:cNvSpPr>
+          <p:nvPr>
+            <p:ph idx="1"/>
+          </p:nvPr>
+        </p:nvSpPr>
+        <p:spPr>
+          <a:xfrm>
+            <a:off x="525381" y="1825625"/>
+            <a:ext cx="4936956" cy="4351338"/>
+          </a:xfrm>
+        </p:spPr>
+        <p:txBody>
+          <a:bodyPr>
+            <a:normAutofit/>
+          </a:bodyPr>
+          <a:lstStyle/>
+          <a:p>
+            <a:pPr>
+              <a:lnSpc>
+                <a:spcPct val="140000"/>
+              </a:lnSpc>
+            </a:pPr>
+            <a:r>
+              <a:rPr lang="en-GB" dirty="0" smtClean="0"/>
+              <a:t>There are two ways we’ll get the values from a column in a data frame or a part of list during the workshop:</a:t>
+            </a:r>
+          </a:p>
+          <a:p>
+            <a:pPr marL="914400" lvl="1" indent="-457200">
+              <a:lnSpc>
+                <a:spcPct val="140000"/>
+              </a:lnSpc>
+              <a:buFont typeface="+mj-lt"/>
+              <a:buAutoNum type="arabicPeriod"/>
+            </a:pPr>
+            <a:r>
+              <a:rPr lang="en-GB" dirty="0" smtClean="0"/>
+              <a:t> </a:t>
+            </a:r>
+            <a:r>
+              <a:rPr lang="en-GB" b="1" dirty="0" err="1" smtClean="0">
+                <a:solidFill>
+                  <a:srgbClr val="0070C0"/>
+                </a:solidFill>
                 <a:latin typeface="Consolas" charset="0"/>
                 <a:ea typeface="Consolas" charset="0"/>
                 <a:cs typeface="Consolas" charset="0"/>
@@ -8278,7 +7931,72 @@
               <a:t>df</a:t>
             </a:r>
             <a:r>
-              <a:rPr lang="en-GB" sz="2000" b="1" dirty="0">
+              <a:rPr lang="en-GB" b="1" dirty="0" smtClean="0">
+                <a:solidFill>
+                  <a:srgbClr val="0070C0"/>
+                </a:solidFill>
+                <a:latin typeface="Consolas" charset="0"/>
+                <a:ea typeface="Consolas" charset="0"/>
+                <a:cs typeface="Consolas" charset="0"/>
+              </a:rPr>
+              <a:t>$</a:t>
+            </a:r>
+            <a:r>
+              <a:rPr lang="de-DE" b="1" dirty="0" err="1" smtClean="0">
+                <a:solidFill>
+                  <a:srgbClr val="0070C0"/>
+                </a:solidFill>
+                <a:latin typeface="Consolas" charset="0"/>
+                <a:ea typeface="Consolas" charset="0"/>
+                <a:cs typeface="Consolas" charset="0"/>
+              </a:rPr>
+              <a:t>colname</a:t>
+            </a:r>
+            <a:r>
+              <a:rPr lang="en-GB" dirty="0"/>
+              <a:t> or </a:t>
+            </a:r>
+            <a:r>
+              <a:rPr lang="de-DE" b="1" dirty="0" err="1" smtClean="0">
+                <a:solidFill>
+                  <a:srgbClr val="0070C0"/>
+                </a:solidFill>
+                <a:latin typeface="Consolas" charset="0"/>
+                <a:ea typeface="Consolas" charset="0"/>
+                <a:cs typeface="Consolas" charset="0"/>
+              </a:rPr>
+              <a:t>list$part</a:t>
+            </a:r>
+            <a:endParaRPr lang="en-GB" dirty="0"/>
+          </a:p>
+          <a:p>
+            <a:pPr marL="914400" lvl="1" indent="-457200">
+              <a:lnSpc>
+                <a:spcPct val="140000"/>
+              </a:lnSpc>
+              <a:buFont typeface="+mj-lt"/>
+              <a:buAutoNum type="arabicPeriod"/>
+            </a:pPr>
+            <a:r>
+              <a:rPr lang="en-GB" dirty="0" smtClean="0"/>
+              <a:t> </a:t>
+            </a:r>
+            <a:r>
+              <a:rPr lang="en-GB" b="1" dirty="0" err="1" smtClean="0">
+                <a:solidFill>
+                  <a:srgbClr val="0070C0"/>
+                </a:solidFill>
+                <a:latin typeface="Consolas" charset="0"/>
+                <a:ea typeface="Consolas" charset="0"/>
+                <a:cs typeface="Consolas" charset="0"/>
+              </a:rPr>
+              <a:t>df</a:t>
+            </a:r>
+            <a:r>
+              <a:rPr lang="en-GB" b="1" dirty="0" smtClean="0">
+                <a:solidFill>
+                  <a:srgbClr val="0070C0"/>
+                </a:solidFill>
                 <a:latin typeface="Consolas" charset="0"/>
                 <a:ea typeface="Consolas" charset="0"/>
                 <a:cs typeface="Consolas" charset="0"/>
@@ -8286,7 +8004,10 @@
               <a:t>[[</a:t>
             </a:r>
             <a:r>
-              <a:rPr lang="ru-RU" sz="2000" b="1" dirty="0">
+              <a:rPr lang="ru-RU" b="1" dirty="0">
+                <a:solidFill>
+                  <a:srgbClr val="0070C0"/>
+                </a:solidFill>
                 <a:latin typeface="Consolas" charset="0"/>
                 <a:ea typeface="Consolas" charset="0"/>
                 <a:cs typeface="Consolas" charset="0"/>
@@ -8294,15 +8015,21 @@
               <a:t>"</a:t>
             </a:r>
             <a:r>
-              <a:rPr lang="de-DE" sz="2000" b="1" dirty="0">
-                <a:latin typeface="Consolas" charset="0"/>
-                <a:ea typeface="Consolas" charset="0"/>
-                <a:cs typeface="Consolas" charset="0"/>
-              </a:rPr>
-              <a:t>col1</a:t>
-            </a:r>
-            <a:r>
-              <a:rPr lang="ru-RU" sz="2000" b="1" dirty="0">
+              <a:rPr lang="de-DE" b="1" dirty="0" err="1">
+                <a:solidFill>
+                  <a:srgbClr val="0070C0"/>
+                </a:solidFill>
+                <a:latin typeface="Consolas" charset="0"/>
+                <a:ea typeface="Consolas" charset="0"/>
+                <a:cs typeface="Consolas" charset="0"/>
+              </a:rPr>
+              <a:t>colname</a:t>
+            </a:r>
+            <a:r>
+              <a:rPr lang="ru-RU" b="1" dirty="0">
+                <a:solidFill>
+                  <a:srgbClr val="0070C0"/>
+                </a:solidFill>
                 <a:latin typeface="Consolas" charset="0"/>
                 <a:ea typeface="Consolas" charset="0"/>
                 <a:cs typeface="Consolas" charset="0"/>
@@ -8310,20 +8037,83 @@
               <a:t>"</a:t>
             </a:r>
             <a:r>
-              <a:rPr lang="de-DE" sz="2000" b="1" dirty="0" smtClean="0">
-                <a:latin typeface="Consolas" charset="0"/>
-                <a:ea typeface="Consolas" charset="0"/>
-                <a:cs typeface="Consolas" charset="0"/>
-              </a:rPr>
-              <a:t>]])</a:t>
-            </a:r>
+              <a:rPr lang="en-GB" b="1" dirty="0" smtClean="0">
+                <a:solidFill>
+                  <a:srgbClr val="0070C0"/>
+                </a:solidFill>
+                <a:latin typeface="Consolas" charset="0"/>
+                <a:ea typeface="Consolas" charset="0"/>
+                <a:cs typeface="Consolas" charset="0"/>
+              </a:rPr>
+              <a:t>]]</a:t>
+            </a:r>
+            <a:r>
+              <a:rPr lang="en-GB" dirty="0"/>
+              <a:t> or </a:t>
+            </a:r>
+            <a:r>
+              <a:rPr lang="en-GB" b="1" dirty="0" smtClean="0">
+                <a:solidFill>
+                  <a:srgbClr val="0070C0"/>
+                </a:solidFill>
+                <a:latin typeface="Consolas" charset="0"/>
+                <a:ea typeface="Consolas" charset="0"/>
+                <a:cs typeface="Consolas" charset="0"/>
+              </a:rPr>
+              <a:t> list[[</a:t>
+            </a:r>
+            <a:r>
+              <a:rPr lang="ru-RU" b="1" dirty="0" smtClean="0">
+                <a:solidFill>
+                  <a:srgbClr val="0070C0"/>
+                </a:solidFill>
+                <a:latin typeface="Consolas" charset="0"/>
+                <a:ea typeface="Consolas" charset="0"/>
+                <a:cs typeface="Consolas" charset="0"/>
+              </a:rPr>
+              <a:t>"</a:t>
+            </a:r>
+            <a:r>
+              <a:rPr lang="de-DE" b="1" dirty="0" err="1" smtClean="0">
+                <a:solidFill>
+                  <a:srgbClr val="0070C0"/>
+                </a:solidFill>
+                <a:latin typeface="Consolas" charset="0"/>
+                <a:ea typeface="Consolas" charset="0"/>
+                <a:cs typeface="Consolas" charset="0"/>
+              </a:rPr>
+              <a:t>part</a:t>
+            </a:r>
+            <a:r>
+              <a:rPr lang="ru-RU" b="1" dirty="0" smtClean="0">
+                <a:solidFill>
+                  <a:srgbClr val="0070C0"/>
+                </a:solidFill>
+                <a:latin typeface="Consolas" charset="0"/>
+                <a:ea typeface="Consolas" charset="0"/>
+                <a:cs typeface="Consolas" charset="0"/>
+              </a:rPr>
+              <a:t>"</a:t>
+            </a:r>
+            <a:r>
+              <a:rPr lang="en-GB" b="1" dirty="0" smtClean="0">
+                <a:solidFill>
+                  <a:srgbClr val="0070C0"/>
+                </a:solidFill>
+                <a:latin typeface="Consolas" charset="0"/>
+                <a:ea typeface="Consolas" charset="0"/>
+                <a:cs typeface="Consolas" charset="0"/>
+              </a:rPr>
+              <a:t>]]</a:t>
+            </a:r>
+            <a:endParaRPr lang="en-GB" dirty="0"/>
           </a:p>
         </p:txBody>
       </p:sp>
     </p:spTree>
     <p:extLst>
       <p:ext uri="{BB962C8B-B14F-4D97-AF65-F5344CB8AC3E}">
-        <p14:creationId xmlns:p14="http://schemas.microsoft.com/office/powerpoint/2010/main" val="455082546"/>
+        <p14:creationId xmlns:p14="http://schemas.microsoft.com/office/powerpoint/2010/main" val="1667445181"/>
       </p:ext>
     </p:extLst>
   </p:cSld>
@@ -8475,8 +8265,8 @@
         </p:nvSpPr>
         <p:spPr>
           <a:xfrm>
-            <a:off x="6376736" y="1825625"/>
-            <a:ext cx="5317146" cy="4351338"/>
+            <a:off x="6256421" y="1507220"/>
+            <a:ext cx="5702967" cy="4814121"/>
           </a:xfrm>
           <a:prstGeom prst="rect">
             <a:avLst/>
@@ -8701,6 +8491,77 @@
               </a:lnSpc>
               <a:buNone/>
             </a:pPr>
+            <a:endParaRPr lang="en-GB" sz="800" b="1" dirty="0" smtClean="0">
+              <a:latin typeface="Consolas" charset="0"/>
+              <a:ea typeface="Consolas" charset="0"/>
+              <a:cs typeface="Consolas" charset="0"/>
+            </a:endParaRPr>
+          </a:p>
+          <a:p>
+            <a:pPr marL="0" indent="0">
+              <a:lnSpc>
+                <a:spcPct val="140000"/>
+              </a:lnSpc>
+              <a:buNone/>
+            </a:pPr>
+            <a:r>
+              <a:rPr lang="en-GB" sz="2000" b="1" dirty="0" err="1" smtClean="0">
+                <a:latin typeface="Consolas" charset="0"/>
+                <a:ea typeface="Consolas" charset="0"/>
+                <a:cs typeface="Consolas" charset="0"/>
+              </a:rPr>
+              <a:t>add_numbers</a:t>
+            </a:r>
+            <a:r>
+              <a:rPr lang="en-GB" sz="2000" b="1" dirty="0" smtClean="0">
+                <a:latin typeface="Consolas" charset="0"/>
+                <a:ea typeface="Consolas" charset="0"/>
+                <a:cs typeface="Consolas" charset="0"/>
+              </a:rPr>
+              <a:t> &lt;- </a:t>
+            </a:r>
+            <a:r>
+              <a:rPr lang="en-GB" sz="2000" b="1" dirty="0" smtClean="0">
+                <a:solidFill>
+                  <a:schemeClr val="tx2">
+                    <a:lumMod val="60000"/>
+                    <a:lumOff val="40000"/>
+                  </a:schemeClr>
+                </a:solidFill>
+                <a:latin typeface="Consolas" charset="0"/>
+                <a:ea typeface="Consolas" charset="0"/>
+                <a:cs typeface="Consolas" charset="0"/>
+              </a:rPr>
+              <a:t> </a:t>
+            </a:r>
+            <a:r>
+              <a:rPr lang="en-GB" sz="2000" b="1" dirty="0">
+                <a:solidFill>
+                  <a:schemeClr val="tx2">
+                    <a:lumMod val="60000"/>
+                    <a:lumOff val="40000"/>
+                  </a:schemeClr>
+                </a:solidFill>
+                <a:latin typeface="Consolas" charset="0"/>
+                <a:ea typeface="Consolas" charset="0"/>
+                <a:cs typeface="Consolas" charset="0"/>
+              </a:rPr>
+              <a:t># </a:t>
+            </a:r>
+            <a:r>
+              <a:rPr lang="en-GB" sz="2000" b="1" dirty="0" smtClean="0">
+                <a:solidFill>
+                  <a:schemeClr val="tx2">
+                    <a:lumMod val="60000"/>
+                    <a:lumOff val="40000"/>
+                  </a:schemeClr>
+                </a:solidFill>
+                <a:latin typeface="Consolas" charset="0"/>
+                <a:ea typeface="Consolas" charset="0"/>
+                <a:cs typeface="Consolas" charset="0"/>
+              </a:rPr>
+              <a:t>assign function</a:t>
+            </a:r>
             <a:endParaRPr lang="en-GB" sz="2000" b="1" dirty="0" smtClean="0">
               <a:latin typeface="Consolas" charset="0"/>
               <a:ea typeface="Consolas" charset="0"/>
@@ -8715,12 +8576,12 @@
               <a:buNone/>
             </a:pPr>
             <a:r>
-              <a:rPr lang="en-GB" sz="2000" b="1" dirty="0" err="1" smtClean="0">
-                <a:latin typeface="Consolas" charset="0"/>
-                <a:ea typeface="Consolas" charset="0"/>
-                <a:cs typeface="Consolas" charset="0"/>
-              </a:rPr>
-              <a:t>function_name</a:t>
+              <a:rPr lang="en-GB" sz="2000" b="1" dirty="0">
+                <a:latin typeface="Consolas" charset="0"/>
+                <a:ea typeface="Consolas" charset="0"/>
+                <a:cs typeface="Consolas" charset="0"/>
+              </a:rPr>
+              <a:t> </a:t>
             </a:r>
             <a:r>
               <a:rPr lang="en-GB" sz="2000" b="1" dirty="0" smtClean="0">
@@ -8728,22 +8589,6 @@
                 <a:ea typeface="Consolas" charset="0"/>
                 <a:cs typeface="Consolas" charset="0"/>
               </a:rPr>
-              <a:t> &lt;-</a:t>
-            </a:r>
-          </a:p>
-          <a:p>
-            <a:pPr marL="0" indent="0">
-              <a:lnSpc>
-                <a:spcPct val="140000"/>
-              </a:lnSpc>
-              <a:buNone/>
-            </a:pPr>
-            <a:r>
-              <a:rPr lang="en-GB" sz="2000" b="1" dirty="0">
-                <a:latin typeface="Consolas" charset="0"/>
-                <a:ea typeface="Consolas" charset="0"/>
-                <a:cs typeface="Consolas" charset="0"/>
-              </a:rPr>
               <a:t> </a:t>
             </a:r>
             <a:r>
@@ -8752,7 +8597,31 @@
                 <a:ea typeface="Consolas" charset="0"/>
                 <a:cs typeface="Consolas" charset="0"/>
               </a:rPr>
-              <a:t> function(argument1, argument2) {</a:t>
+              <a:t>function(arg1</a:t>
+            </a:r>
+            <a:r>
+              <a:rPr lang="en-GB" sz="2000" b="1" dirty="0" smtClean="0">
+                <a:latin typeface="Consolas" charset="0"/>
+                <a:ea typeface="Consolas" charset="0"/>
+                <a:cs typeface="Consolas" charset="0"/>
+              </a:rPr>
+              <a:t>, </a:t>
+            </a:r>
+            <a:r>
+              <a:rPr lang="en-GB" sz="2000" b="1" dirty="0" smtClean="0">
+                <a:latin typeface="Consolas" charset="0"/>
+                <a:ea typeface="Consolas" charset="0"/>
+                <a:cs typeface="Consolas" charset="0"/>
+              </a:rPr>
+              <a:t>arg2</a:t>
+            </a:r>
+            <a:r>
+              <a:rPr lang="en-GB" sz="2000" b="1" dirty="0" smtClean="0">
+                <a:latin typeface="Consolas" charset="0"/>
+                <a:ea typeface="Consolas" charset="0"/>
+                <a:cs typeface="Consolas" charset="0"/>
+              </a:rPr>
+              <a:t>) {</a:t>
             </a:r>
           </a:p>
           <a:p>
@@ -8839,8 +8708,37 @@
                 <a:ea typeface="Consolas" charset="0"/>
                 <a:cs typeface="Consolas" charset="0"/>
               </a:rPr>
-              <a:t>    argument1 + argument2    </a:t>
-            </a:r>
+              <a:t>    </a:t>
+            </a:r>
+            <a:r>
+              <a:rPr lang="en-GB" sz="2000" b="1" dirty="0" smtClean="0">
+                <a:latin typeface="Consolas" charset="0"/>
+                <a:ea typeface="Consolas" charset="0"/>
+                <a:cs typeface="Consolas" charset="0"/>
+              </a:rPr>
+              <a:t>arg1 </a:t>
+            </a:r>
+            <a:r>
+              <a:rPr lang="en-GB" sz="2000" b="1" dirty="0" smtClean="0">
+                <a:latin typeface="Consolas" charset="0"/>
+                <a:ea typeface="Consolas" charset="0"/>
+                <a:cs typeface="Consolas" charset="0"/>
+              </a:rPr>
+              <a:t>+ </a:t>
+            </a:r>
+            <a:r>
+              <a:rPr lang="en-GB" sz="2000" b="1" dirty="0" smtClean="0">
+                <a:latin typeface="Consolas" charset="0"/>
+                <a:ea typeface="Consolas" charset="0"/>
+                <a:cs typeface="Consolas" charset="0"/>
+              </a:rPr>
+              <a:t>arg2    </a:t>
+            </a:r>
+            <a:endParaRPr lang="en-GB" sz="2000" b="1" dirty="0" smtClean="0">
+              <a:latin typeface="Consolas" charset="0"/>
+              <a:ea typeface="Consolas" charset="0"/>
+              <a:cs typeface="Consolas" charset="0"/>
+            </a:endParaRPr>
           </a:p>
           <a:p>
             <a:pPr marL="0" indent="0">
@@ -8857,6 +8755,62 @@
               </a:rPr>
               <a:t>}</a:t>
             </a:r>
+          </a:p>
+          <a:p>
+            <a:pPr marL="0" indent="0">
+              <a:lnSpc>
+                <a:spcPct val="140000"/>
+              </a:lnSpc>
+              <a:buNone/>
+            </a:pPr>
+            <a:endParaRPr lang="en-GB" sz="2000" b="1" dirty="0" smtClean="0">
+              <a:latin typeface="Consolas" charset="0"/>
+              <a:ea typeface="Consolas" charset="0"/>
+              <a:cs typeface="Consolas" charset="0"/>
+            </a:endParaRPr>
+          </a:p>
+          <a:p>
+            <a:pPr marL="0" indent="0">
+              <a:lnSpc>
+                <a:spcPct val="140000"/>
+              </a:lnSpc>
+              <a:buNone/>
+            </a:pPr>
+            <a:r>
+              <a:rPr lang="en-GB" sz="2000" b="1" dirty="0" err="1" smtClean="0">
+                <a:latin typeface="Consolas" charset="0"/>
+                <a:ea typeface="Consolas" charset="0"/>
+                <a:cs typeface="Consolas" charset="0"/>
+              </a:rPr>
+              <a:t>add_numbers</a:t>
+            </a:r>
+            <a:r>
+              <a:rPr lang="en-GB" sz="2000" b="1" dirty="0" smtClean="0">
+                <a:latin typeface="Consolas" charset="0"/>
+                <a:ea typeface="Consolas" charset="0"/>
+                <a:cs typeface="Consolas" charset="0"/>
+              </a:rPr>
+              <a:t>(1+2)  </a:t>
+            </a:r>
+            <a:r>
+              <a:rPr lang="en-GB" sz="2000" b="1" dirty="0" smtClean="0">
+                <a:solidFill>
+                  <a:schemeClr val="tx2">
+                    <a:lumMod val="60000"/>
+                    <a:lumOff val="40000"/>
+                  </a:schemeClr>
+                </a:solidFill>
+                <a:latin typeface="Consolas" charset="0"/>
+                <a:ea typeface="Consolas" charset="0"/>
+                <a:cs typeface="Consolas" charset="0"/>
+              </a:rPr>
+              <a:t># use function later</a:t>
+            </a:r>
+            <a:endParaRPr lang="en-GB" sz="2000" b="1" dirty="0" smtClean="0">
+              <a:latin typeface="Consolas" charset="0"/>
+              <a:ea typeface="Consolas" charset="0"/>
+              <a:cs typeface="Consolas" charset="0"/>
+            </a:endParaRPr>
           </a:p>
         </p:txBody>
       </p:sp>

</xml_diff>